<commit_message>
Updated firewalls rules in PPT
</commit_message>
<xml_diff>
--- a/docs/System Administration Initial Design.pptx
+++ b/docs/System Administration Initial Design.pptx
@@ -6977,14 +6977,14 @@
           <p:nvPr>
             <p:extLst>
               <p:ext uri="{D42A27DB-BD31-4B8C-83A1-F6EECF244321}">
-                <p14:modId xmlns:p14="http://schemas.microsoft.com/office/powerpoint/2010/main" val="3133124561"/>
+                <p14:modId xmlns:p14="http://schemas.microsoft.com/office/powerpoint/2010/main" val="166562802"/>
               </p:ext>
             </p:extLst>
           </p:nvPr>
         </p:nvGraphicFramePr>
         <p:xfrm>
           <a:off x="8488513" y="763678"/>
-          <a:ext cx="2641600" cy="4922520"/>
+          <a:ext cx="2641600" cy="5052060"/>
         </p:xfrm>
         <a:graphic>
           <a:graphicData uri="http://schemas.openxmlformats.org/drawingml/2006/table">
@@ -7011,160 +7011,152 @@
                         <a:buNone/>
                       </a:pPr>
                       <a:r>
-                        <a:rPr lang="en-US" sz="1100" b="1" u="none" strike="noStrike" dirty="0">
+                        <a:rPr lang="en-US" sz="1000" b="1" u="none" strike="noStrike" dirty="0">
                           <a:effectLst/>
                         </a:rPr>
                         <a:t>Firewall Rules</a:t>
                       </a:r>
                       <a:br>
-                        <a:rPr lang="en-US" sz="1100" u="none" strike="noStrike" dirty="0">
+                        <a:rPr lang="en-US" sz="1000" u="none" strike="noStrike" dirty="0">
                           <a:effectLst/>
                         </a:rPr>
                       </a:br>
+                      <a:endParaRPr lang="en-US" sz="1000" u="none" strike="noStrike" dirty="0">
+                        <a:effectLst/>
+                      </a:endParaRPr>
+                    </a:p>
+                    <a:p>
+                      <a:pPr algn="l" fontAlgn="b">
+                        <a:buNone/>
+                      </a:pPr>
                       <a:r>
-                        <a:rPr lang="en-US" sz="1100" u="none" strike="noStrike" dirty="0">
+                        <a:rPr lang="en-US" sz="1000" u="none" strike="noStrike" dirty="0">
                           <a:effectLst/>
                         </a:rPr>
                         <a:t>Allow WAN → Web Server TCP 443/80, </a:t>
-                      </a:r>
-                      <a:br>
-                        <a:rPr lang="en-US" sz="1100" u="none" strike="noStrike" dirty="0">
-                          <a:effectLst/>
-                        </a:rPr>
-                      </a:br>
-                      <a:r>
-                        <a:rPr lang="en-US" sz="1100" u="none" strike="noStrike" dirty="0">
-                          <a:effectLst/>
-                        </a:rPr>
-                        <a:t>Allow Management VLAN → Web Server TCP 22/3389, </a:t>
-                      </a:r>
-                      <a:br>
-                        <a:rPr lang="en-US" sz="1100" u="none" strike="noStrike" dirty="0">
-                          <a:effectLst/>
-                        </a:rPr>
-                      </a:br>
-                      <a:r>
-                        <a:rPr lang="en-US" sz="1100" u="none" strike="noStrike" dirty="0">
-                          <a:effectLst/>
-                        </a:rPr>
-                        <a:t>Deny all else, </a:t>
-                      </a:r>
-                      <a:br>
-                        <a:rPr lang="en-US" sz="1100" u="none" strike="noStrike" dirty="0">
-                          <a:effectLst/>
-                        </a:rPr>
-                      </a:br>
-                      <a:r>
-                        <a:rPr lang="en-US" sz="1100" u="none" strike="noStrike" dirty="0">
-                          <a:effectLst/>
-                        </a:rPr>
-                        <a:t>Allow Web Servers → Database TCP 3306, </a:t>
-                      </a:r>
-                      <a:br>
-                        <a:rPr lang="en-US" sz="1100" u="none" strike="noStrike" dirty="0">
-                          <a:effectLst/>
-                        </a:rPr>
-                      </a:br>
-                      <a:r>
-                        <a:rPr lang="en-US" sz="1100" u="none" strike="noStrike" dirty="0">
-                          <a:effectLst/>
-                        </a:rPr>
-                        <a:t>Allow VLAN 201 → Database TCP 3306, </a:t>
-                      </a:r>
-                      <a:br>
-                        <a:rPr lang="en-US" sz="1100" u="none" strike="noStrike" dirty="0">
-                          <a:effectLst/>
-                        </a:rPr>
-                      </a:br>
-                      <a:r>
-                        <a:rPr lang="en-US" sz="1100" u="none" strike="noStrike" dirty="0">
-                          <a:effectLst/>
-                        </a:rPr>
-                        <a:t>Deny all else, </a:t>
-                      </a:r>
-                      <a:br>
-                        <a:rPr lang="en-US" sz="1100" u="none" strike="noStrike" dirty="0">
-                          <a:effectLst/>
-                        </a:rPr>
-                      </a:br>
-                      <a:r>
-                        <a:rPr lang="en-US" sz="1100" u="none" strike="noStrike" dirty="0">
-                          <a:effectLst/>
-                        </a:rPr>
-                        <a:t>Allow VLAN 201 → File Server TCP 445/139,</a:t>
-                      </a:r>
-                      <a:br>
-                        <a:rPr lang="en-US" sz="1100" u="none" strike="noStrike" dirty="0">
-                          <a:effectLst/>
-                        </a:rPr>
-                      </a:br>
-                      <a:r>
-                        <a:rPr lang="en-US" sz="1100" u="none" strike="noStrike" dirty="0">
-                          <a:effectLst/>
-                        </a:rPr>
-                        <a:t>Allow VLAN 202 → File Server TCP 445/139, </a:t>
-                      </a:r>
-                      <a:br>
-                        <a:rPr lang="en-US" sz="1100" u="none" strike="noStrike" dirty="0">
-                          <a:effectLst/>
-                        </a:rPr>
-                      </a:br>
-                      <a:r>
-                        <a:rPr lang="en-US" sz="1100" u="none" strike="noStrike" dirty="0">
-                          <a:effectLst/>
-                        </a:rPr>
-                        <a:t>Allow VLAN 201 → SIEM TCP 514/443, </a:t>
-                      </a:r>
-                      <a:br>
-                        <a:rPr lang="en-US" sz="1100" u="none" strike="noStrike" dirty="0">
-                          <a:effectLst/>
-                        </a:rPr>
-                      </a:br>
-                      <a:r>
-                        <a:rPr lang="en-US" sz="1100" u="none" strike="noStrike" dirty="0">
-                          <a:effectLst/>
-                        </a:rPr>
-                        <a:t>Allow SIEM → all servers for log collection</a:t>
-                      </a:r>
-                      <a:br>
-                        <a:rPr lang="en-US" sz="1100" u="none" strike="noStrike" dirty="0">
-                          <a:effectLst/>
-                        </a:rPr>
-                      </a:br>
-                      <a:r>
-                        <a:rPr lang="en-US" sz="1100" u="none" strike="noStrike" dirty="0">
-                          <a:effectLst/>
-                        </a:rPr>
-                        <a:t>Allow VLAN 201 → Backup TCP 22/873/445</a:t>
-                      </a:r>
-                      <a:br>
-                        <a:rPr lang="en-US" sz="1100" u="none" strike="noStrike" dirty="0">
-                          <a:effectLst/>
-                        </a:rPr>
-                      </a:br>
-                      <a:r>
-                        <a:rPr lang="en-US" sz="1100" u="none" strike="noStrike" dirty="0">
-                          <a:effectLst/>
-                        </a:rPr>
-                        <a:t>Allow VLAN 201 → all servers (necessary ports only), </a:t>
-                      </a:r>
-                      <a:br>
-                        <a:rPr lang="en-US" sz="1100" u="none" strike="noStrike" dirty="0">
-                          <a:effectLst/>
-                        </a:rPr>
-                      </a:br>
-                      <a:r>
-                        <a:rPr lang="en-US" sz="1100" u="none" strike="noStrike" dirty="0">
-                          <a:effectLst/>
-                        </a:rPr>
-                        <a:t>Allow Admin → VPN TCP 1194, Deny all else</a:t>
                       </a:r>
                     </a:p>
                     <a:p>
                       <a:pPr algn="l" fontAlgn="b">
                         <a:buNone/>
                       </a:pPr>
-                      <a:endParaRPr lang="en-US" sz="1100" b="0" i="0" u="none" strike="noStrike" dirty="0">
+                      <a:r>
+                        <a:rPr lang="en-US" sz="1000" u="none" strike="noStrike" dirty="0">
+                          <a:effectLst/>
+                        </a:rPr>
+                        <a:t>Allow VLAN 201 → Web Server TCP 22/3389, Deny all else, </a:t>
+                      </a:r>
+                    </a:p>
+                    <a:p>
+                      <a:pPr algn="l" fontAlgn="b">
+                        <a:buNone/>
+                      </a:pPr>
+                      <a:r>
+                        <a:rPr lang="en-US" sz="1000" u="none" strike="noStrike" dirty="0">
+                          <a:effectLst/>
+                        </a:rPr>
+                        <a:t>Allow Web Servers → Database TCP 3306, </a:t>
+                      </a:r>
+                    </a:p>
+                    <a:p>
+                      <a:pPr algn="l" fontAlgn="b">
+                        <a:buNone/>
+                      </a:pPr>
+                      <a:r>
+                        <a:rPr lang="en-US" sz="1000" u="none" strike="noStrike" dirty="0">
+                          <a:effectLst/>
+                        </a:rPr>
+                        <a:t>Allow VLAN 201 → Database TCP 3306, </a:t>
+                      </a:r>
+                    </a:p>
+                    <a:p>
+                      <a:pPr algn="l" fontAlgn="b">
+                        <a:buNone/>
+                      </a:pPr>
+                      <a:r>
+                        <a:rPr lang="en-US" sz="1000" u="none" strike="noStrike" dirty="0">
+                          <a:effectLst/>
+                        </a:rPr>
+                        <a:t>Deny all else, </a:t>
+                      </a:r>
+                    </a:p>
+                    <a:p>
+                      <a:pPr algn="l" fontAlgn="b">
+                        <a:buNone/>
+                      </a:pPr>
+                      <a:r>
+                        <a:rPr lang="en-US" sz="1000" u="none" strike="noStrike" dirty="0">
+                          <a:effectLst/>
+                        </a:rPr>
+                        <a:t>Allow VLAN 201 → File Server TCP 445/139,</a:t>
+                      </a:r>
+                    </a:p>
+                    <a:p>
+                      <a:pPr algn="l" fontAlgn="b">
+                        <a:buNone/>
+                      </a:pPr>
+                      <a:r>
+                        <a:rPr lang="en-US" sz="1000" u="none" strike="noStrike" dirty="0">
+                          <a:effectLst/>
+                        </a:rPr>
+                        <a:t>Allow VLAN 202 → File Server TCP 445/139, </a:t>
+                      </a:r>
+                    </a:p>
+                    <a:p>
+                      <a:pPr algn="l" fontAlgn="b">
+                        <a:buNone/>
+                      </a:pPr>
+                      <a:r>
+                        <a:rPr lang="en-US" sz="1000" u="none" strike="noStrike" dirty="0">
+                          <a:effectLst/>
+                        </a:rPr>
+                        <a:t>Allow VLAN 201 → SIEM TCP 514/443, </a:t>
+                      </a:r>
+                    </a:p>
+                    <a:p>
+                      <a:pPr algn="l" fontAlgn="b">
+                        <a:buNone/>
+                      </a:pPr>
+                      <a:r>
+                        <a:rPr lang="en-US" sz="1000" u="none" strike="noStrike" dirty="0">
+                          <a:effectLst/>
+                        </a:rPr>
+                        <a:t>Allow SIEM → all servers for log collection, Deny all else, </a:t>
+                      </a:r>
+                    </a:p>
+                    <a:p>
+                      <a:pPr algn="l" fontAlgn="b">
+                        <a:buNone/>
+                      </a:pPr>
+                      <a:r>
+                        <a:rPr lang="en-US" sz="1000" u="none" strike="noStrike" dirty="0">
+                          <a:effectLst/>
+                        </a:rPr>
+                        <a:t>Allow VLAN 201 → Backup TCP 22/873/445, Deny all else, </a:t>
+                      </a:r>
+                    </a:p>
+                    <a:p>
+                      <a:pPr algn="l" fontAlgn="b">
+                        <a:buNone/>
+                      </a:pPr>
+                      <a:r>
+                        <a:rPr lang="en-US" sz="1000" u="none" strike="noStrike" dirty="0">
+                          <a:effectLst/>
+                        </a:rPr>
+                        <a:t>Allow VLAN 201 → all servers (necessary ports only), </a:t>
+                      </a:r>
+                    </a:p>
+                    <a:p>
+                      <a:pPr algn="l" fontAlgn="b">
+                        <a:buNone/>
+                      </a:pPr>
+                      <a:r>
+                        <a:rPr lang="en-US" sz="1000" u="none" strike="noStrike" dirty="0">
+                          <a:effectLst/>
+                        </a:rPr>
+                        <a:t>Allow Admin → VPN TCP 1194, Deny all else</a:t>
+                      </a:r>
+                      <a:endParaRPr lang="en-US" sz="1000" b="0" i="0" u="none" strike="noStrike" dirty="0">
                         <a:solidFill>
                           <a:srgbClr val="000000"/>
                         </a:solidFill>
@@ -7191,7 +7183,7 @@
                         <a:buNone/>
                       </a:pPr>
                       <a:r>
-                        <a:rPr lang="en-US" sz="1100" u="none" strike="noStrike" dirty="0">
+                        <a:rPr lang="en-US" sz="1000" u="none" strike="noStrike" dirty="0">
                           <a:effectLst/>
                         </a:rPr>
                         <a:t>Allow VLAN 201 → all servers (necessary ports only), Deny all other access</a:t>
@@ -7201,7 +7193,7 @@
                       <a:pPr algn="l" fontAlgn="b">
                         <a:buNone/>
                       </a:pPr>
-                      <a:endParaRPr lang="en-US" sz="1100" b="0" i="0" u="none" strike="noStrike" dirty="0">
+                      <a:endParaRPr lang="en-US" sz="1000" b="0" i="0" u="none" strike="noStrike" dirty="0">
                         <a:solidFill>
                           <a:srgbClr val="000000"/>
                         </a:solidFill>
@@ -7228,12 +7220,67 @@
                         <a:buNone/>
                       </a:pPr>
                       <a:r>
-                        <a:rPr lang="en-US" sz="1100" u="none" strike="noStrike" dirty="0">
+                        <a:rPr lang="en-US" sz="1000" u="none" strike="noStrike" dirty="0">
                           <a:effectLst/>
                         </a:rPr>
                         <a:t>Allow VLAN 202 → DNS TCP/UDP 53, Allow VLAN 202 → Web TCP 80/443, Deny inter-VLAN traffic</a:t>
                       </a:r>
-                      <a:endParaRPr lang="en-US" sz="1100" b="0" i="0" u="none" strike="noStrike" dirty="0">
+                    </a:p>
+                    <a:p>
+                      <a:pPr algn="l" fontAlgn="b">
+                        <a:buNone/>
+                      </a:pPr>
+                      <a:endParaRPr lang="en-US" sz="1000" u="none" strike="noStrike" dirty="0">
+                        <a:effectLst/>
+                      </a:endParaRPr>
+                    </a:p>
+                    <a:p>
+                      <a:pPr algn="l" fontAlgn="b">
+                        <a:buNone/>
+                      </a:pPr>
+                      <a:r>
+                        <a:rPr lang="en-US" sz="1000" u="none" strike="noStrike" dirty="0">
+                          <a:effectLst/>
+                        </a:rPr>
+                        <a:t>Allow VLAN 201 → all servers (necessary ports only), Deny all other access</a:t>
+                      </a:r>
+                    </a:p>
+                    <a:p>
+                      <a:pPr algn="l" fontAlgn="b">
+                        <a:buNone/>
+                      </a:pPr>
+                      <a:endParaRPr lang="en-US" sz="1000" u="none" strike="noStrike" dirty="0">
+                        <a:effectLst/>
+                      </a:endParaRPr>
+                    </a:p>
+                    <a:p>
+                      <a:pPr algn="l" fontAlgn="b">
+                        <a:buNone/>
+                      </a:pPr>
+                      <a:r>
+                        <a:rPr lang="en-US" sz="1000" u="none" strike="noStrike" dirty="0">
+                          <a:effectLst/>
+                        </a:rPr>
+                        <a:t>Allow VLAN 202 → DNS TCP/UDP 53, Allow VLAN 202 → Web TCP 80/443, Deny inter-VLAN traffic</a:t>
+                      </a:r>
+                    </a:p>
+                    <a:p>
+                      <a:pPr algn="l" fontAlgn="b">
+                        <a:buNone/>
+                      </a:pPr>
+                      <a:endParaRPr lang="en-US" sz="1000" b="0" i="0" u="none" strike="noStrike" dirty="0">
+                        <a:solidFill>
+                          <a:srgbClr val="000000"/>
+                        </a:solidFill>
+                        <a:effectLst/>
+                        <a:latin typeface="Calibri" panose="020F0502020204030204" pitchFamily="34" charset="0"/>
+                      </a:endParaRPr>
+                    </a:p>
+                    <a:p>
+                      <a:pPr algn="l" fontAlgn="b">
+                        <a:buNone/>
+                      </a:pPr>
+                      <a:endParaRPr lang="en-US" sz="1000" b="0" i="0" u="none" strike="noStrike" dirty="0">
                         <a:solidFill>
                           <a:srgbClr val="000000"/>
                         </a:solidFill>
@@ -8992,6 +9039,15 @@
 </file>
 
 <file path=customXml/item1.xml><?xml version="1.0" encoding="utf-8"?>
+<?mso-contentType ?>
+<FormTemplates xmlns="http://schemas.microsoft.com/sharepoint/v3/contenttype/forms">
+  <Display>DocumentLibraryForm</Display>
+  <Edit>DocumentLibraryForm</Edit>
+  <New>DocumentLibraryForm</New>
+</FormTemplates>
+</file>
+
+<file path=customXml/item2.xml><?xml version="1.0" encoding="utf-8"?>
 <p:properties xmlns:p="http://schemas.microsoft.com/office/2006/metadata/properties" xmlns:xsi="http://www.w3.org/2001/XMLSchema-instance" xmlns:pc="http://schemas.microsoft.com/office/infopath/2007/PartnerControls">
   <documentManagement>
     <_ip_UnifiedCompliancePolicyUIAction xmlns="http://schemas.microsoft.com/sharepoint/v3" xsi:nil="true"/>
@@ -9009,15 +9065,6 @@
     <MediaServiceKeyPoints xmlns="71af3243-3dd4-4a8d-8c0d-dd76da1f02a5" xsi:nil="true"/>
   </documentManagement>
 </p:properties>
-</file>
-
-<file path=customXml/item2.xml><?xml version="1.0" encoding="utf-8"?>
-<?mso-contentType ?>
-<FormTemplates xmlns="http://schemas.microsoft.com/sharepoint/v3/contenttype/forms">
-  <Display>DocumentLibraryForm</Display>
-  <Edit>DocumentLibraryForm</Edit>
-  <New>DocumentLibraryForm</New>
-</FormTemplates>
 </file>
 
 <file path=customXml/item3.xml><?xml version="1.0" encoding="utf-8"?>
@@ -9333,6 +9380,14 @@
 </file>
 
 <file path=customXml/itemProps1.xml><?xml version="1.0" encoding="utf-8"?>
+<ds:datastoreItem xmlns:ds="http://schemas.openxmlformats.org/officeDocument/2006/customXml" ds:itemID="{6DE3707C-8CAB-4302-B7E1-D32E1543E05C}">
+  <ds:schemaRefs>
+    <ds:schemaRef ds:uri="http://schemas.microsoft.com/sharepoint/v3/contenttype/forms"/>
+  </ds:schemaRefs>
+</ds:datastoreItem>
+</file>
+
+<file path=customXml/itemProps2.xml><?xml version="1.0" encoding="utf-8"?>
 <ds:datastoreItem xmlns:ds="http://schemas.openxmlformats.org/officeDocument/2006/customXml" ds:itemID="{3FDB7358-0BCB-4DEB-B717-C1D7CC555F05}">
   <ds:schemaRefs>
     <ds:schemaRef ds:uri="http://schemas.microsoft.com/office/2006/metadata/properties"/>
@@ -9340,14 +9395,6 @@
     <ds:schemaRef ds:uri="http://schemas.microsoft.com/sharepoint/v3"/>
     <ds:schemaRef ds:uri="71af3243-3dd4-4a8d-8c0d-dd76da1f02a5"/>
     <ds:schemaRef ds:uri="230e9df3-be65-4c73-a93b-d1236ebd677e"/>
-  </ds:schemaRefs>
-</ds:datastoreItem>
-</file>
-
-<file path=customXml/itemProps2.xml><?xml version="1.0" encoding="utf-8"?>
-<ds:datastoreItem xmlns:ds="http://schemas.openxmlformats.org/officeDocument/2006/customXml" ds:itemID="{6DE3707C-8CAB-4302-B7E1-D32E1543E05C}">
-  <ds:schemaRefs>
-    <ds:schemaRef ds:uri="http://schemas.microsoft.com/sharepoint/v3/contenttype/forms"/>
   </ds:schemaRefs>
 </ds:datastoreItem>
 </file>

</xml_diff>